<commit_message>
Don't know the difference, but committing it anyway.
</commit_message>
<xml_diff>
--- a/docs/ports_and_adapters.pptx
+++ b/docs/ports_and_adapters.pptx
@@ -3034,6 +3034,13 @@
   <p:clrMapOvr>
     <a:masterClrMapping/>
   </p:clrMapOvr>
+  <p:timing>
+    <p:tnLst>
+      <p:par>
+        <p:cTn id="1" dur="indefinite" restart="never" nodeType="tmRoot"/>
+      </p:par>
+    </p:tnLst>
+  </p:timing>
 </p:sld>
 </file>
 
@@ -3173,6 +3180,13 @@
   <p:clrMapOvr>
     <a:masterClrMapping/>
   </p:clrMapOvr>
+  <p:timing>
+    <p:tnLst>
+      <p:par>
+        <p:cTn id="1" dur="indefinite" restart="never" nodeType="tmRoot"/>
+      </p:par>
+    </p:tnLst>
+  </p:timing>
 </p:sld>
 </file>
 
@@ -3263,6 +3277,13 @@
   <p:clrMapOvr>
     <a:masterClrMapping/>
   </p:clrMapOvr>
+  <p:timing>
+    <p:tnLst>
+      <p:par>
+        <p:cTn id="1" dur="indefinite" restart="never" nodeType="tmRoot"/>
+      </p:par>
+    </p:tnLst>
+  </p:timing>
 </p:sld>
 </file>
 
@@ -3525,6 +3546,13 @@
   <p:clrMapOvr>
     <a:masterClrMapping/>
   </p:clrMapOvr>
+  <p:timing>
+    <p:tnLst>
+      <p:par>
+        <p:cTn id="1" dur="indefinite" restart="never" nodeType="tmRoot"/>
+      </p:par>
+    </p:tnLst>
+  </p:timing>
 </p:sld>
 </file>
 
@@ -3742,6 +3770,13 @@
   <p:clrMapOvr>
     <a:masterClrMapping/>
   </p:clrMapOvr>
+  <p:timing>
+    <p:tnLst>
+      <p:par>
+        <p:cTn id="1" dur="indefinite" restart="never" nodeType="tmRoot"/>
+      </p:par>
+    </p:tnLst>
+  </p:timing>
 </p:sld>
 </file>
 
@@ -3852,6 +3887,13 @@
   <p:clrMapOvr>
     <a:masterClrMapping/>
   </p:clrMapOvr>
+  <p:timing>
+    <p:tnLst>
+      <p:par>
+        <p:cTn id="1" dur="indefinite" restart="never" nodeType="tmRoot"/>
+      </p:par>
+    </p:tnLst>
+  </p:timing>
 </p:sld>
 </file>
 
@@ -3979,6 +4021,13 @@
   <p:clrMapOvr>
     <a:masterClrMapping/>
   </p:clrMapOvr>
+  <p:timing>
+    <p:tnLst>
+      <p:par>
+        <p:cTn id="1" dur="indefinite" restart="never" nodeType="tmRoot"/>
+      </p:par>
+    </p:tnLst>
+  </p:timing>
 </p:sld>
 </file>
 
@@ -4287,6 +4336,13 @@
   <p:clrMapOvr>
     <a:masterClrMapping/>
   </p:clrMapOvr>
+  <p:timing>
+    <p:tnLst>
+      <p:par>
+        <p:cTn id="1" dur="indefinite" restart="never" nodeType="tmRoot"/>
+      </p:par>
+    </p:tnLst>
+  </p:timing>
 </p:sld>
 </file>
 
@@ -4409,6 +4465,13 @@
   <p:clrMapOvr>
     <a:masterClrMapping/>
   </p:clrMapOvr>
+  <p:timing>
+    <p:tnLst>
+      <p:par>
+        <p:cTn id="1" dur="indefinite" restart="never" nodeType="tmRoot"/>
+      </p:par>
+    </p:tnLst>
+  </p:timing>
 </p:sld>
 </file>
 
@@ -4542,10 +4605,10 @@
               <a:t>Use interface in </a:t>
             </a:r>
             <a:r>
-              <a:rPr lang="en-US" smtClean="0"/>
+              <a:rPr lang="en-US" dirty="0" err="1" smtClean="0"/>
               <a:t>BirthdayService</a:t>
             </a:r>
-            <a:endParaRPr lang="nl-BE"/>
+            <a:endParaRPr lang="nl-BE" dirty="0"/>
           </a:p>
         </p:txBody>
       </p:sp>
@@ -4559,6 +4622,13 @@
   <p:clrMapOvr>
     <a:masterClrMapping/>
   </p:clrMapOvr>
+  <p:timing>
+    <p:tnLst>
+      <p:par>
+        <p:cTn id="1" dur="indefinite" restart="never" nodeType="tmRoot"/>
+      </p:par>
+    </p:tnLst>
+  </p:timing>
 </p:sld>
 </file>
 

</xml_diff>